<commit_message>
Style: Mise à jour du style du chp1-chp7
Mise en forme du contenu du sommaire à 24 px
Mettre en gras tous les titres de pages
Mettre en italique les mots clés
</commit_message>
<xml_diff>
--- a/source/Chapitre 1 - Introduction et installation.pptx
+++ b/source/Chapitre 1 - Introduction et installation.pptx
@@ -123,14 +123,6 @@
 </p:presentation>
 </file>
 
-<file path=ppt/revisionInfo.xml><?xml version="1.0" encoding="utf-8"?>
-<p1510:revInfo xmlns:a="http://schemas.openxmlformats.org/drawingml/2006/main" xmlns:r="http://schemas.openxmlformats.org/officeDocument/2006/relationships" xmlns:p1510="http://schemas.microsoft.com/office/powerpoint/2015/10/main">
-  <p1510:revLst>
-    <p1510:client id="{11537C92-A8D5-F940-A295-4D4053ECE68F}" v="56" dt="2023-07-02T15:28:22.038"/>
-  </p1510:revLst>
-</p1510:revInfo>
-</file>
-
 <file path=ppt/changesInfos/changesInfo1.xml><?xml version="1.0" encoding="utf-8"?>
 <pc:chgInfo xmlns:a="http://schemas.openxmlformats.org/drawingml/2006/main" xmlns:r="http://schemas.openxmlformats.org/officeDocument/2006/relationships" xmlns:ac="http://schemas.microsoft.com/office/drawing/2013/main/command" xmlns:pc="http://schemas.microsoft.com/office/powerpoint/2013/main/command">
   <pc:docChgLst>
@@ -161,6 +153,144 @@
           <pc:docMk/>
           <pc:sldMk cId="652286414" sldId="287"/>
         </pc:sldMkLst>
+      </pc:sldChg>
+    </pc:docChg>
+  </pc:docChgLst>
+  <pc:docChgLst>
+    <pc:chgData name="Ismaël Tuo" userId="fca7baf0e513a1e6" providerId="LiveId" clId="{CB412C82-70CE-4C5A-9969-1D3E7575B92E}"/>
+    <pc:docChg chg="custSel modSld">
+      <pc:chgData name="Ismaël Tuo" userId="fca7baf0e513a1e6" providerId="LiveId" clId="{CB412C82-70CE-4C5A-9969-1D3E7575B92E}" dt="2023-11-12T17:28:02.235" v="9" actId="113"/>
+      <pc:docMkLst>
+        <pc:docMk/>
+      </pc:docMkLst>
+      <pc:sldChg chg="modSp mod">
+        <pc:chgData name="Ismaël Tuo" userId="fca7baf0e513a1e6" providerId="LiveId" clId="{CB412C82-70CE-4C5A-9969-1D3E7575B92E}" dt="2023-11-12T17:27:09.663" v="1" actId="403"/>
+        <pc:sldMkLst>
+          <pc:docMk/>
+          <pc:sldMk cId="1268069196" sldId="285"/>
+        </pc:sldMkLst>
+        <pc:spChg chg="mod">
+          <ac:chgData name="Ismaël Tuo" userId="fca7baf0e513a1e6" providerId="LiveId" clId="{CB412C82-70CE-4C5A-9969-1D3E7575B92E}" dt="2023-11-12T17:27:07.023" v="0" actId="113"/>
+          <ac:spMkLst>
+            <pc:docMk/>
+            <pc:sldMk cId="1268069196" sldId="285"/>
+            <ac:spMk id="6" creationId="{84F10693-2FE8-EFC8-8DB6-84BFD181D260}"/>
+          </ac:spMkLst>
+        </pc:spChg>
+        <pc:spChg chg="mod">
+          <ac:chgData name="Ismaël Tuo" userId="fca7baf0e513a1e6" providerId="LiveId" clId="{CB412C82-70CE-4C5A-9969-1D3E7575B92E}" dt="2023-11-12T17:27:09.663" v="1" actId="403"/>
+          <ac:spMkLst>
+            <pc:docMk/>
+            <pc:sldMk cId="1268069196" sldId="285"/>
+            <ac:spMk id="11" creationId="{C27A3656-3CB0-8161-AE9F-B92FBE4F5083}"/>
+          </ac:spMkLst>
+        </pc:spChg>
+      </pc:sldChg>
+      <pc:sldChg chg="modSp mod">
+        <pc:chgData name="Ismaël Tuo" userId="fca7baf0e513a1e6" providerId="LiveId" clId="{CB412C82-70CE-4C5A-9969-1D3E7575B92E}" dt="2023-11-12T17:27:23.122" v="3" actId="33524"/>
+        <pc:sldMkLst>
+          <pc:docMk/>
+          <pc:sldMk cId="2639441608" sldId="286"/>
+        </pc:sldMkLst>
+        <pc:spChg chg="mod">
+          <ac:chgData name="Ismaël Tuo" userId="fca7baf0e513a1e6" providerId="LiveId" clId="{CB412C82-70CE-4C5A-9969-1D3E7575B92E}" dt="2023-11-12T17:27:14.948" v="2" actId="113"/>
+          <ac:spMkLst>
+            <pc:docMk/>
+            <pc:sldMk cId="2639441608" sldId="286"/>
+            <ac:spMk id="6" creationId="{84F10693-2FE8-EFC8-8DB6-84BFD181D260}"/>
+          </ac:spMkLst>
+        </pc:spChg>
+        <pc:spChg chg="mod">
+          <ac:chgData name="Ismaël Tuo" userId="fca7baf0e513a1e6" providerId="LiveId" clId="{CB412C82-70CE-4C5A-9969-1D3E7575B92E}" dt="2023-11-12T17:27:23.122" v="3" actId="33524"/>
+          <ac:spMkLst>
+            <pc:docMk/>
+            <pc:sldMk cId="2639441608" sldId="286"/>
+            <ac:spMk id="13" creationId="{1CD90E12-4258-18E9-0100-5F3A3E1FD75A}"/>
+          </ac:spMkLst>
+        </pc:spChg>
+      </pc:sldChg>
+      <pc:sldChg chg="modSp mod">
+        <pc:chgData name="Ismaël Tuo" userId="fca7baf0e513a1e6" providerId="LiveId" clId="{CB412C82-70CE-4C5A-9969-1D3E7575B92E}" dt="2023-11-12T17:27:32.989" v="5" actId="33524"/>
+        <pc:sldMkLst>
+          <pc:docMk/>
+          <pc:sldMk cId="1264287648" sldId="287"/>
+        </pc:sldMkLst>
+        <pc:spChg chg="mod">
+          <ac:chgData name="Ismaël Tuo" userId="fca7baf0e513a1e6" providerId="LiveId" clId="{CB412C82-70CE-4C5A-9969-1D3E7575B92E}" dt="2023-11-12T17:27:28.138" v="4" actId="113"/>
+          <ac:spMkLst>
+            <pc:docMk/>
+            <pc:sldMk cId="1264287648" sldId="287"/>
+            <ac:spMk id="6" creationId="{84F10693-2FE8-EFC8-8DB6-84BFD181D260}"/>
+          </ac:spMkLst>
+        </pc:spChg>
+        <pc:spChg chg="mod">
+          <ac:chgData name="Ismaël Tuo" userId="fca7baf0e513a1e6" providerId="LiveId" clId="{CB412C82-70CE-4C5A-9969-1D3E7575B92E}" dt="2023-11-12T17:27:32.989" v="5" actId="33524"/>
+          <ac:spMkLst>
+            <pc:docMk/>
+            <pc:sldMk cId="1264287648" sldId="287"/>
+            <ac:spMk id="10" creationId="{C5C206E8-EE12-6BE3-191C-3D04E8210B62}"/>
+          </ac:spMkLst>
+        </pc:spChg>
+      </pc:sldChg>
+      <pc:sldChg chg="modSp mod">
+        <pc:chgData name="Ismaël Tuo" userId="fca7baf0e513a1e6" providerId="LiveId" clId="{CB412C82-70CE-4C5A-9969-1D3E7575B92E}" dt="2023-11-12T17:27:37.755" v="6" actId="113"/>
+        <pc:sldMkLst>
+          <pc:docMk/>
+          <pc:sldMk cId="4054907751" sldId="288"/>
+        </pc:sldMkLst>
+        <pc:spChg chg="mod">
+          <ac:chgData name="Ismaël Tuo" userId="fca7baf0e513a1e6" providerId="LiveId" clId="{CB412C82-70CE-4C5A-9969-1D3E7575B92E}" dt="2023-11-12T17:27:37.755" v="6" actId="113"/>
+          <ac:spMkLst>
+            <pc:docMk/>
+            <pc:sldMk cId="4054907751" sldId="288"/>
+            <ac:spMk id="6" creationId="{84F10693-2FE8-EFC8-8DB6-84BFD181D260}"/>
+          </ac:spMkLst>
+        </pc:spChg>
+      </pc:sldChg>
+      <pc:sldChg chg="modSp mod">
+        <pc:chgData name="Ismaël Tuo" userId="fca7baf0e513a1e6" providerId="LiveId" clId="{CB412C82-70CE-4C5A-9969-1D3E7575B92E}" dt="2023-11-12T17:27:44.100" v="7" actId="113"/>
+        <pc:sldMkLst>
+          <pc:docMk/>
+          <pc:sldMk cId="215611455" sldId="289"/>
+        </pc:sldMkLst>
+        <pc:spChg chg="mod">
+          <ac:chgData name="Ismaël Tuo" userId="fca7baf0e513a1e6" providerId="LiveId" clId="{CB412C82-70CE-4C5A-9969-1D3E7575B92E}" dt="2023-11-12T17:27:44.100" v="7" actId="113"/>
+          <ac:spMkLst>
+            <pc:docMk/>
+            <pc:sldMk cId="215611455" sldId="289"/>
+            <ac:spMk id="6" creationId="{84F10693-2FE8-EFC8-8DB6-84BFD181D260}"/>
+          </ac:spMkLst>
+        </pc:spChg>
+      </pc:sldChg>
+      <pc:sldChg chg="modSp mod">
+        <pc:chgData name="Ismaël Tuo" userId="fca7baf0e513a1e6" providerId="LiveId" clId="{CB412C82-70CE-4C5A-9969-1D3E7575B92E}" dt="2023-11-12T17:28:02.235" v="9" actId="113"/>
+        <pc:sldMkLst>
+          <pc:docMk/>
+          <pc:sldMk cId="3666646187" sldId="290"/>
+        </pc:sldMkLst>
+        <pc:spChg chg="mod">
+          <ac:chgData name="Ismaël Tuo" userId="fca7baf0e513a1e6" providerId="LiveId" clId="{CB412C82-70CE-4C5A-9969-1D3E7575B92E}" dt="2023-11-12T17:28:02.235" v="9" actId="113"/>
+          <ac:spMkLst>
+            <pc:docMk/>
+            <pc:sldMk cId="3666646187" sldId="290"/>
+            <ac:spMk id="6" creationId="{84F10693-2FE8-EFC8-8DB6-84BFD181D260}"/>
+          </ac:spMkLst>
+        </pc:spChg>
+      </pc:sldChg>
+      <pc:sldChg chg="modSp mod">
+        <pc:chgData name="Ismaël Tuo" userId="fca7baf0e513a1e6" providerId="LiveId" clId="{CB412C82-70CE-4C5A-9969-1D3E7575B92E}" dt="2023-11-12T17:27:56.513" v="8" actId="113"/>
+        <pc:sldMkLst>
+          <pc:docMk/>
+          <pc:sldMk cId="3224966230" sldId="291"/>
+        </pc:sldMkLst>
+        <pc:spChg chg="mod">
+          <ac:chgData name="Ismaël Tuo" userId="fca7baf0e513a1e6" providerId="LiveId" clId="{CB412C82-70CE-4C5A-9969-1D3E7575B92E}" dt="2023-11-12T17:27:56.513" v="8" actId="113"/>
+          <ac:spMkLst>
+            <pc:docMk/>
+            <pc:sldMk cId="3224966230" sldId="291"/>
+            <ac:spMk id="6" creationId="{84F10693-2FE8-EFC8-8DB6-84BFD181D260}"/>
+          </ac:spMkLst>
+        </pc:spChg>
       </pc:sldChg>
     </pc:docChg>
   </pc:docChgLst>
@@ -913,7 +1043,7 @@
           <a:p>
             <a:fld id="{5D1B8971-FAD5-A544-A565-5C81831E2E08}" type="datetimeFigureOut">
               <a:rPr lang="fr-FR" smtClean="0"/>
-              <a:t>02/07/2023</a:t>
+              <a:t>12/11/2023</a:t>
             </a:fld>
             <a:endParaRPr lang="fr-FR"/>
           </a:p>
@@ -1511,7 +1641,7 @@
           <a:p>
             <a:fld id="{446AF453-C717-E044-9B61-C449088DBB9F}" type="datetime1">
               <a:rPr lang="fr-FR" smtClean="0"/>
-              <a:t>02/07/2023</a:t>
+              <a:t>12/11/2023</a:t>
             </a:fld>
             <a:endParaRPr lang="fr-FR"/>
           </a:p>
@@ -1685,7 +1815,7 @@
           <a:p>
             <a:fld id="{0AD74B8B-4B66-A54B-A7E1-EB9F6C09CE67}" type="datetime1">
               <a:rPr lang="fr-FR" smtClean="0"/>
-              <a:t>02/07/2023</a:t>
+              <a:t>12/11/2023</a:t>
             </a:fld>
             <a:endParaRPr lang="fr-FR"/>
           </a:p>
@@ -1869,7 +1999,7 @@
           <a:p>
             <a:fld id="{9584F9F2-42A0-CD42-8013-986AEAF97421}" type="datetime1">
               <a:rPr lang="fr-FR" smtClean="0"/>
-              <a:t>02/07/2023</a:t>
+              <a:t>12/11/2023</a:t>
             </a:fld>
             <a:endParaRPr lang="fr-FR"/>
           </a:p>
@@ -2043,7 +2173,7 @@
           <a:p>
             <a:fld id="{DAB9BD9F-3179-BB4C-96AB-C40862581685}" type="datetime1">
               <a:rPr lang="fr-FR" smtClean="0"/>
-              <a:t>02/07/2023</a:t>
+              <a:t>12/11/2023</a:t>
             </a:fld>
             <a:endParaRPr lang="fr-FR"/>
           </a:p>
@@ -2315,7 +2445,7 @@
           <a:p>
             <a:fld id="{A664DE96-64FF-BC43-8A9C-18ED43A528D6}" type="datetime1">
               <a:rPr lang="fr-FR" smtClean="0"/>
-              <a:t>02/07/2023</a:t>
+              <a:t>12/11/2023</a:t>
             </a:fld>
             <a:endParaRPr lang="fr-FR"/>
           </a:p>
@@ -2551,7 +2681,7 @@
           <a:p>
             <a:fld id="{2C8FE800-9F9B-1C4F-A1CD-9EF46842C4CA}" type="datetime1">
               <a:rPr lang="fr-FR" smtClean="0"/>
-              <a:t>02/07/2023</a:t>
+              <a:t>12/11/2023</a:t>
             </a:fld>
             <a:endParaRPr lang="fr-FR"/>
           </a:p>
@@ -2914,7 +3044,7 @@
           <a:p>
             <a:fld id="{0F7DED4E-8CB4-EF40-A349-EFC02EC7784E}" type="datetime1">
               <a:rPr lang="fr-FR" smtClean="0"/>
-              <a:t>02/07/2023</a:t>
+              <a:t>12/11/2023</a:t>
             </a:fld>
             <a:endParaRPr lang="fr-FR"/>
           </a:p>
@@ -3059,7 +3189,7 @@
           <a:p>
             <a:fld id="{5BB88D77-E8A2-E24F-81D2-817E60779F3E}" type="datetime1">
               <a:rPr lang="fr-FR" smtClean="0"/>
-              <a:t>02/07/2023</a:t>
+              <a:t>12/11/2023</a:t>
             </a:fld>
             <a:endParaRPr lang="fr-FR"/>
           </a:p>
@@ -3158,7 +3288,7 @@
           <a:p>
             <a:fld id="{817F964E-5B57-884A-A1B8-925BFA5276AF}" type="datetime1">
               <a:rPr lang="fr-FR" smtClean="0"/>
-              <a:t>02/07/2023</a:t>
+              <a:t>12/11/2023</a:t>
             </a:fld>
             <a:endParaRPr lang="fr-FR"/>
           </a:p>
@@ -3519,7 +3649,7 @@
           <a:p>
             <a:fld id="{D5636CD0-A2E6-1543-A0E5-C829C16FEE55}" type="datetime1">
               <a:rPr lang="fr-FR" smtClean="0"/>
-              <a:t>02/07/2023</a:t>
+              <a:t>12/11/2023</a:t>
             </a:fld>
             <a:endParaRPr lang="fr-FR"/>
           </a:p>
@@ -3880,7 +4010,7 @@
           <a:p>
             <a:fld id="{CEE5CE4A-5B1A-1846-BA66-722BDB7A9525}" type="datetime1">
               <a:rPr lang="fr-FR" smtClean="0"/>
-              <a:t>02/07/2023</a:t>
+              <a:t>12/11/2023</a:t>
             </a:fld>
             <a:endParaRPr lang="fr-FR"/>
           </a:p>
@@ -4127,7 +4257,7 @@
           <a:p>
             <a:fld id="{55A13D9C-CA6E-9C45-8634-4423EBFFD553}" type="datetime1">
               <a:rPr lang="fr-FR" smtClean="0"/>
-              <a:t>02/07/2023</a:t>
+              <a:t>12/11/2023</a:t>
             </a:fld>
             <a:endParaRPr lang="fr-FR"/>
           </a:p>
@@ -5040,7 +5170,7 @@
           <a:lstStyle/>
           <a:p>
             <a:r>
-              <a:rPr lang="fr-FR" sz="2800" dirty="0"/>
+              <a:rPr lang="fr-FR" sz="2800" b="1" dirty="0"/>
               <a:t>Sommaire</a:t>
             </a:r>
           </a:p>
@@ -5061,7 +5191,7 @@
         <p:spPr>
           <a:xfrm>
             <a:off x="397565" y="872066"/>
-            <a:ext cx="9192515" cy="2308324"/>
+            <a:ext cx="9192515" cy="2677656"/>
           </a:xfrm>
           <a:prstGeom prst="rect">
             <a:avLst/>
@@ -5079,14 +5209,14 @@
               <a:buAutoNum type="arabicPeriod"/>
             </a:pPr>
             <a:r>
-              <a:rPr lang="fr-FR" sz="2400" dirty="0">
+              <a:rPr lang="fr-FR" sz="2800" dirty="0">
                 <a:latin typeface="Times New Roman" panose="02020603050405020304" pitchFamily="18" charset="0"/>
                 <a:cs typeface="Times New Roman" panose="02020603050405020304" pitchFamily="18" charset="0"/>
                 <a:hlinkClick r:id="rId2" action="ppaction://hlinksldjump"/>
               </a:rPr>
               <a:t>Langage machine</a:t>
             </a:r>
-            <a:endParaRPr lang="fr-FR" sz="2400" dirty="0">
+            <a:endParaRPr lang="fr-FR" sz="2800" dirty="0">
               <a:latin typeface="Times New Roman" panose="02020603050405020304" pitchFamily="18" charset="0"/>
               <a:cs typeface="Times New Roman" panose="02020603050405020304" pitchFamily="18" charset="0"/>
             </a:endParaRPr>
@@ -5097,14 +5227,14 @@
               <a:buAutoNum type="arabicPeriod"/>
             </a:pPr>
             <a:r>
-              <a:rPr lang="fr-FR" sz="2400" dirty="0">
+              <a:rPr lang="fr-FR" sz="2800" dirty="0">
                 <a:latin typeface="Times New Roman" panose="02020603050405020304" pitchFamily="18" charset="0"/>
                 <a:cs typeface="Times New Roman" panose="02020603050405020304" pitchFamily="18" charset="0"/>
                 <a:hlinkClick r:id="rId3" action="ppaction://hlinksldjump"/>
               </a:rPr>
               <a:t>Langage de programmation</a:t>
             </a:r>
-            <a:endParaRPr lang="fr-FR" sz="2400" dirty="0">
+            <a:endParaRPr lang="fr-FR" sz="2800" dirty="0">
               <a:latin typeface="Times New Roman" panose="02020603050405020304" pitchFamily="18" charset="0"/>
               <a:cs typeface="Times New Roman" panose="02020603050405020304" pitchFamily="18" charset="0"/>
             </a:endParaRPr>
@@ -5115,14 +5245,14 @@
               <a:buAutoNum type="arabicPeriod"/>
             </a:pPr>
             <a:r>
-              <a:rPr lang="fr-FR" sz="2400" dirty="0">
+              <a:rPr lang="fr-FR" sz="2800" dirty="0">
                 <a:latin typeface="Times New Roman" panose="02020603050405020304" pitchFamily="18" charset="0"/>
                 <a:cs typeface="Times New Roman" panose="02020603050405020304" pitchFamily="18" charset="0"/>
                 <a:hlinkClick r:id="rId4" action="ppaction://hlinksldjump"/>
               </a:rPr>
               <a:t>Langage Python</a:t>
             </a:r>
-            <a:endParaRPr lang="fr-FR" sz="2400" dirty="0">
+            <a:endParaRPr lang="fr-FR" sz="2800" dirty="0">
               <a:latin typeface="Times New Roman" panose="02020603050405020304" pitchFamily="18" charset="0"/>
               <a:cs typeface="Times New Roman" panose="02020603050405020304" pitchFamily="18" charset="0"/>
             </a:endParaRPr>
@@ -5133,14 +5263,14 @@
               <a:buAutoNum type="arabicPeriod"/>
             </a:pPr>
             <a:r>
-              <a:rPr lang="fr-FR" sz="2400" dirty="0">
+              <a:rPr lang="fr-FR" sz="2800" dirty="0">
                 <a:latin typeface="Times New Roman" panose="02020603050405020304" pitchFamily="18" charset="0"/>
                 <a:cs typeface="Times New Roman" panose="02020603050405020304" pitchFamily="18" charset="0"/>
                 <a:hlinkClick r:id="rId5" action="ppaction://hlinksldjump"/>
               </a:rPr>
               <a:t>Installation de Python</a:t>
             </a:r>
-            <a:endParaRPr lang="fr-FR" sz="2400" dirty="0">
+            <a:endParaRPr lang="fr-FR" sz="2800" dirty="0">
               <a:latin typeface="Times New Roman" panose="02020603050405020304" pitchFamily="18" charset="0"/>
               <a:cs typeface="Times New Roman" panose="02020603050405020304" pitchFamily="18" charset="0"/>
             </a:endParaRPr>
@@ -5151,14 +5281,14 @@
               <a:buAutoNum type="arabicPeriod"/>
             </a:pPr>
             <a:r>
-              <a:rPr lang="fr-FR" sz="2400" dirty="0">
+              <a:rPr lang="fr-FR" sz="2800" dirty="0">
                 <a:latin typeface="Times New Roman" panose="02020603050405020304" pitchFamily="18" charset="0"/>
                 <a:cs typeface="Times New Roman" panose="02020603050405020304" pitchFamily="18" charset="0"/>
                 <a:hlinkClick r:id="rId6" action="ppaction://hlinksldjump"/>
               </a:rPr>
               <a:t>Utilisation de l’interpréteur</a:t>
             </a:r>
-            <a:endParaRPr lang="fr-FR" sz="2400" dirty="0">
+            <a:endParaRPr lang="fr-FR" sz="2800" dirty="0">
               <a:latin typeface="Times New Roman" panose="02020603050405020304" pitchFamily="18" charset="0"/>
               <a:cs typeface="Times New Roman" panose="02020603050405020304" pitchFamily="18" charset="0"/>
             </a:endParaRPr>
@@ -5169,14 +5299,14 @@
               <a:buAutoNum type="arabicPeriod"/>
             </a:pPr>
             <a:r>
-              <a:rPr lang="fr-FR" sz="2400" dirty="0">
+              <a:rPr lang="fr-FR" sz="2800" dirty="0">
                 <a:latin typeface="Times New Roman" panose="02020603050405020304" pitchFamily="18" charset="0"/>
                 <a:cs typeface="Times New Roman" panose="02020603050405020304" pitchFamily="18" charset="0"/>
                 <a:hlinkClick r:id="rId7" action="ppaction://hlinksldjump"/>
               </a:rPr>
               <a:t>Installation de Visual Studio Code</a:t>
             </a:r>
-            <a:endParaRPr lang="fr-FR" sz="2400" dirty="0">
+            <a:endParaRPr lang="fr-FR" sz="2800" dirty="0">
               <a:latin typeface="Times New Roman" panose="02020603050405020304" pitchFamily="18" charset="0"/>
               <a:cs typeface="Times New Roman" panose="02020603050405020304" pitchFamily="18" charset="0"/>
             </a:endParaRPr>
@@ -5339,7 +5469,7 @@
           <a:lstStyle/>
           <a:p>
             <a:r>
-              <a:rPr lang="fr-FR" sz="2400" dirty="0">
+              <a:rPr lang="fr-FR" sz="2400" b="1" dirty="0">
                 <a:latin typeface="Times New Roman" panose="02020603050405020304" pitchFamily="18" charset="0"/>
                 <a:cs typeface="Times New Roman" panose="02020603050405020304" pitchFamily="18" charset="0"/>
               </a:rPr>
@@ -5634,7 +5764,7 @@
                 <a:latin typeface="Times New Roman" panose="02020603050405020304" pitchFamily="18" charset="0"/>
                 <a:cs typeface="Times New Roman" panose="02020603050405020304" pitchFamily="18" charset="0"/>
               </a:rPr>
-              <a:t>Un programme a pour but d’aider l’humain a communiquer avec un ordinateur. </a:t>
+              <a:t>Un programme a pour but d’aider l’humain à communiquer avec un ordinateur. </a:t>
             </a:r>
           </a:p>
         </p:txBody>
@@ -5798,7 +5928,7 @@
           <a:lstStyle/>
           <a:p>
             <a:r>
-              <a:rPr lang="fr-FR" sz="2400" dirty="0">
+              <a:rPr lang="fr-FR" sz="2400" b="1" dirty="0">
                 <a:latin typeface="Times New Roman" panose="02020603050405020304" pitchFamily="18" charset="0"/>
                 <a:cs typeface="Times New Roman" panose="02020603050405020304" pitchFamily="18" charset="0"/>
               </a:rPr>
@@ -5910,7 +6040,7 @@
                 <a:latin typeface="Times New Roman" panose="02020603050405020304" pitchFamily="18" charset="0"/>
                 <a:cs typeface="Times New Roman" panose="02020603050405020304" pitchFamily="18" charset="0"/>
               </a:rPr>
-              <a:t>Il existe une grand nombre de langages de programmation dont Python. Chaque langage de programmation dispose de sa syntaxe et son vocabulaire.</a:t>
+              <a:t>Il existe un grand nombre de langages de programmation dont Python. Chaque langage de programmation dispose de sa syntaxe et son vocabulaire.</a:t>
             </a:r>
           </a:p>
           <a:p>
@@ -6081,7 +6211,7 @@
           <a:lstStyle/>
           <a:p>
             <a:r>
-              <a:rPr lang="fr-FR" sz="2400" dirty="0">
+              <a:rPr lang="fr-FR" sz="2400" b="1" dirty="0">
                 <a:latin typeface="Times New Roman" panose="02020603050405020304" pitchFamily="18" charset="0"/>
                 <a:cs typeface="Times New Roman" panose="02020603050405020304" pitchFamily="18" charset="0"/>
               </a:rPr>
@@ -6582,7 +6712,7 @@
           <a:lstStyle/>
           <a:p>
             <a:r>
-              <a:rPr lang="fr-FR" sz="2400" dirty="0">
+              <a:rPr lang="fr-FR" sz="2400" b="1" dirty="0">
                 <a:latin typeface="Times New Roman" panose="02020603050405020304" pitchFamily="18" charset="0"/>
                 <a:cs typeface="Times New Roman" panose="02020603050405020304" pitchFamily="18" charset="0"/>
               </a:rPr>
@@ -6985,7 +7115,7 @@
           <a:lstStyle/>
           <a:p>
             <a:r>
-              <a:rPr lang="fr-FR" sz="2400" dirty="0">
+              <a:rPr lang="fr-FR" sz="2400" b="1" dirty="0">
                 <a:latin typeface="Times New Roman" panose="02020603050405020304" pitchFamily="18" charset="0"/>
                 <a:cs typeface="Times New Roman" panose="02020603050405020304" pitchFamily="18" charset="0"/>
               </a:rPr>
@@ -7414,7 +7544,7 @@
           <a:lstStyle/>
           <a:p>
             <a:r>
-              <a:rPr lang="fr-FR" sz="2400" dirty="0">
+              <a:rPr lang="fr-FR" sz="2400" b="1" dirty="0">
                 <a:latin typeface="Times New Roman" panose="02020603050405020304" pitchFamily="18" charset="0"/>
                 <a:cs typeface="Times New Roman" panose="02020603050405020304" pitchFamily="18" charset="0"/>
               </a:rPr>

</xml_diff>